<commit_message>
done with the simple template
</commit_message>
<xml_diff>
--- a/workshop_slides.pptx
+++ b/workshop_slides.pptx
@@ -26,6 +26,7 @@
     <p:sldId id="274" r:id="rId20"/>
     <p:sldId id="275" r:id="rId21"/>
     <p:sldId id="276" r:id="rId22"/>
+    <p:sldId id="277" r:id="rId23"/>
   </p:sldIdLst>
   <p:sldSz cx="12192000" cy="6858000"/>
   <p:notesSz cx="6858000" cy="9144000"/>
@@ -9427,12 +9428,14 @@
           </a:xfrm>
         </p:spPr>
         <p:txBody>
-          <a:bodyPr/>
-          <a:lstStyle/>
-          <a:p>
-            <a:r>
-              <a:rPr lang="en-US" dirty="0"/>
-              <a:t>Lets Add Structured Output</a:t>
+          <a:bodyPr>
+            <a:normAutofit/>
+          </a:bodyPr>
+          <a:lstStyle/>
+          <a:p>
+            <a:r>
+              <a:rPr lang="en-US" dirty="0"/>
+              <a:t>Let’s Add Structured Output</a:t>
             </a:r>
           </a:p>
         </p:txBody>
@@ -9476,6 +9479,151 @@
     <p:extLst>
       <p:ext uri="{BB962C8B-B14F-4D97-AF65-F5344CB8AC3E}">
         <p14:creationId xmlns:p14="http://schemas.microsoft.com/office/powerpoint/2010/main" val="1819017534"/>
+      </p:ext>
+    </p:extLst>
+  </p:cSld>
+  <p:clrMapOvr>
+    <a:masterClrMapping/>
+  </p:clrMapOvr>
+</p:sld>
+</file>
+
+<file path=ppt/slides/slide22.xml><?xml version="1.0" encoding="utf-8"?>
+<p:sld xmlns:a="http://schemas.openxmlformats.org/drawingml/2006/main" xmlns:r="http://schemas.openxmlformats.org/officeDocument/2006/relationships" xmlns:p="http://schemas.openxmlformats.org/presentationml/2006/main">
+  <p:cSld>
+    <p:spTree>
+      <p:nvGrpSpPr>
+        <p:cNvPr id="1" name="">
+          <a:extLst>
+            <a:ext uri="{FF2B5EF4-FFF2-40B4-BE49-F238E27FC236}">
+              <a16:creationId xmlns:a16="http://schemas.microsoft.com/office/drawing/2014/main" id="{BFE1214F-8B30-4980-9479-3DB246E7E9FF}"/>
+            </a:ext>
+          </a:extLst>
+        </p:cNvPr>
+        <p:cNvGrpSpPr/>
+        <p:nvPr/>
+      </p:nvGrpSpPr>
+      <p:grpSpPr>
+        <a:xfrm>
+          <a:off x="0" y="0"/>
+          <a:ext cx="0" cy="0"/>
+          <a:chOff x="0" y="0"/>
+          <a:chExt cx="0" cy="0"/>
+        </a:xfrm>
+      </p:grpSpPr>
+      <p:sp>
+        <p:nvSpPr>
+          <p:cNvPr id="2" name="Title 1">
+            <a:extLst>
+              <a:ext uri="{FF2B5EF4-FFF2-40B4-BE49-F238E27FC236}">
+                <a16:creationId xmlns:a16="http://schemas.microsoft.com/office/drawing/2014/main" id="{4D1F1792-FB9F-ACC4-634E-6853DDB0D839}"/>
+              </a:ext>
+            </a:extLst>
+          </p:cNvPr>
+          <p:cNvSpPr>
+            <a:spLocks noGrp="1"/>
+          </p:cNvSpPr>
+          <p:nvPr>
+            <p:ph type="title"/>
+          </p:nvPr>
+        </p:nvSpPr>
+        <p:spPr>
+          <a:xfrm>
+            <a:off x="2592925" y="624110"/>
+            <a:ext cx="8911687" cy="810054"/>
+          </a:xfrm>
+        </p:spPr>
+        <p:txBody>
+          <a:bodyPr>
+            <a:normAutofit/>
+          </a:bodyPr>
+          <a:lstStyle/>
+          <a:p>
+            <a:r>
+              <a:rPr lang="en-US" dirty="0"/>
+              <a:t>Putting things in LangGraph</a:t>
+            </a:r>
+          </a:p>
+        </p:txBody>
+      </p:sp>
+      <p:sp>
+        <p:nvSpPr>
+          <p:cNvPr id="7" name="TextBox 6">
+            <a:extLst>
+              <a:ext uri="{FF2B5EF4-FFF2-40B4-BE49-F238E27FC236}">
+                <a16:creationId xmlns:a16="http://schemas.microsoft.com/office/drawing/2014/main" id="{3E8BF197-474F-6DC5-675F-FBD1B08FC232}"/>
+              </a:ext>
+            </a:extLst>
+          </p:cNvPr>
+          <p:cNvSpPr txBox="1"/>
+          <p:nvPr/>
+        </p:nvSpPr>
+        <p:spPr>
+          <a:xfrm>
+            <a:off x="3041583" y="3251553"/>
+            <a:ext cx="6102416" cy="923330"/>
+          </a:xfrm>
+          <a:prstGeom prst="rect">
+            <a:avLst/>
+          </a:prstGeom>
+          <a:noFill/>
+        </p:spPr>
+        <p:txBody>
+          <a:bodyPr wrap="square">
+            <a:spAutoFit/>
+          </a:bodyPr>
+          <a:lstStyle/>
+          <a:p>
+            <a:r>
+              <a:rPr lang="en-US" b="1" dirty="0"/>
+              <a:t>Simplest Architecture</a:t>
+            </a:r>
+          </a:p>
+          <a:p>
+            <a:br>
+              <a:rPr lang="en-US" dirty="0"/>
+            </a:br>
+            <a:r>
+              <a:rPr lang="en-US" dirty="0"/>
+              <a:t>stock_agent_v2.py</a:t>
+            </a:r>
+          </a:p>
+        </p:txBody>
+      </p:sp>
+      <p:pic>
+        <p:nvPicPr>
+          <p:cNvPr id="4" name="Picture 3" descr="A diagram of a stock recommender&#10;&#10;AI-generated content may be incorrect.">
+            <a:extLst>
+              <a:ext uri="{FF2B5EF4-FFF2-40B4-BE49-F238E27FC236}">
+                <a16:creationId xmlns:a16="http://schemas.microsoft.com/office/drawing/2014/main" id="{D1579997-722F-5EB9-8525-F509E37E721B}"/>
+              </a:ext>
+            </a:extLst>
+          </p:cNvPr>
+          <p:cNvPicPr>
+            <a:picLocks noChangeAspect="1"/>
+          </p:cNvPicPr>
+          <p:nvPr/>
+        </p:nvPicPr>
+        <p:blipFill>
+          <a:blip r:embed="rId2"/>
+          <a:stretch>
+            <a:fillRect/>
+          </a:stretch>
+        </p:blipFill>
+        <p:spPr>
+          <a:xfrm>
+            <a:off x="7482187" y="2110572"/>
+            <a:ext cx="2971629" cy="3659796"/>
+          </a:xfrm>
+          <a:prstGeom prst="rect">
+            <a:avLst/>
+          </a:prstGeom>
+        </p:spPr>
+      </p:pic>
+    </p:spTree>
+    <p:extLst>
+      <p:ext uri="{BB962C8B-B14F-4D97-AF65-F5344CB8AC3E}">
+        <p14:creationId xmlns:p14="http://schemas.microsoft.com/office/powerpoint/2010/main" val="2503374106"/>
       </p:ext>
     </p:extLst>
   </p:cSld>

</xml_diff>